<commit_message>
Section 4 review and changes. First draft complete
</commit_message>
<xml_diff>
--- a/Section 4 - Advanced Topics/4.0DatabaseDevOps.pptx
+++ b/Section 4 - Advanced Topics/4.0DatabaseDevOps.pptx
@@ -9,23 +9,25 @@
     <p:sldId id="267" r:id="rId3"/>
     <p:sldId id="264" r:id="rId4"/>
     <p:sldId id="266" r:id="rId5"/>
-    <p:sldId id="265" r:id="rId6"/>
-    <p:sldId id="269" r:id="rId7"/>
+    <p:sldId id="269" r:id="rId6"/>
+    <p:sldId id="265" r:id="rId7"/>
     <p:sldId id="270" r:id="rId8"/>
     <p:sldId id="271" r:id="rId9"/>
     <p:sldId id="268" r:id="rId10"/>
     <p:sldId id="260" r:id="rId11"/>
     <p:sldId id="272" r:id="rId12"/>
     <p:sldId id="263" r:id="rId13"/>
-    <p:sldId id="273" r:id="rId14"/>
-    <p:sldId id="259" r:id="rId15"/>
-    <p:sldId id="274" r:id="rId16"/>
-    <p:sldId id="261" r:id="rId17"/>
-    <p:sldId id="275" r:id="rId18"/>
-    <p:sldId id="276" r:id="rId19"/>
-    <p:sldId id="257" r:id="rId20"/>
-    <p:sldId id="258" r:id="rId21"/>
-    <p:sldId id="262" r:id="rId22"/>
+    <p:sldId id="274" r:id="rId14"/>
+    <p:sldId id="261" r:id="rId15"/>
+    <p:sldId id="277" r:id="rId16"/>
+    <p:sldId id="273" r:id="rId17"/>
+    <p:sldId id="259" r:id="rId18"/>
+    <p:sldId id="275" r:id="rId19"/>
+    <p:sldId id="276" r:id="rId20"/>
+    <p:sldId id="278" r:id="rId21"/>
+    <p:sldId id="257" r:id="rId22"/>
+    <p:sldId id="262" r:id="rId23"/>
+    <p:sldId id="258" r:id="rId24"/>
   </p:sldIdLst>
   <p:sldSz cx="12192000" cy="6858000"/>
   <p:notesSz cx="6858000" cy="9144000"/>
@@ -261,7 +263,7 @@
           <a:p>
             <a:fld id="{D936F25B-2EB7-4F2E-A375-7E2BED8EDC16}" type="datetimeFigureOut">
               <a:rPr lang="en-US" smtClean="0"/>
-              <a:t>3/17/2017</a:t>
+              <a:t>3/18/2017</a:t>
             </a:fld>
             <a:endParaRPr lang="en-US"/>
           </a:p>
@@ -429,7 +431,7 @@
           <a:p>
             <a:fld id="{D936F25B-2EB7-4F2E-A375-7E2BED8EDC16}" type="datetimeFigureOut">
               <a:rPr lang="en-US" smtClean="0"/>
-              <a:t>3/17/2017</a:t>
+              <a:t>3/18/2017</a:t>
             </a:fld>
             <a:endParaRPr lang="en-US"/>
           </a:p>
@@ -607,7 +609,7 @@
           <a:p>
             <a:fld id="{D936F25B-2EB7-4F2E-A375-7E2BED8EDC16}" type="datetimeFigureOut">
               <a:rPr lang="en-US" smtClean="0"/>
-              <a:t>3/17/2017</a:t>
+              <a:t>3/18/2017</a:t>
             </a:fld>
             <a:endParaRPr lang="en-US"/>
           </a:p>
@@ -775,7 +777,7 @@
           <a:p>
             <a:fld id="{D936F25B-2EB7-4F2E-A375-7E2BED8EDC16}" type="datetimeFigureOut">
               <a:rPr lang="en-US" smtClean="0"/>
-              <a:t>3/17/2017</a:t>
+              <a:t>3/18/2017</a:t>
             </a:fld>
             <a:endParaRPr lang="en-US"/>
           </a:p>
@@ -1020,7 +1022,7 @@
           <a:p>
             <a:fld id="{D936F25B-2EB7-4F2E-A375-7E2BED8EDC16}" type="datetimeFigureOut">
               <a:rPr lang="en-US" smtClean="0"/>
-              <a:t>3/17/2017</a:t>
+              <a:t>3/18/2017</a:t>
             </a:fld>
             <a:endParaRPr lang="en-US"/>
           </a:p>
@@ -1249,7 +1251,7 @@
           <a:p>
             <a:fld id="{D936F25B-2EB7-4F2E-A375-7E2BED8EDC16}" type="datetimeFigureOut">
               <a:rPr lang="en-US" smtClean="0"/>
-              <a:t>3/17/2017</a:t>
+              <a:t>3/18/2017</a:t>
             </a:fld>
             <a:endParaRPr lang="en-US"/>
           </a:p>
@@ -1613,7 +1615,7 @@
           <a:p>
             <a:fld id="{D936F25B-2EB7-4F2E-A375-7E2BED8EDC16}" type="datetimeFigureOut">
               <a:rPr lang="en-US" smtClean="0"/>
-              <a:t>3/17/2017</a:t>
+              <a:t>3/18/2017</a:t>
             </a:fld>
             <a:endParaRPr lang="en-US"/>
           </a:p>
@@ -1730,7 +1732,7 @@
           <a:p>
             <a:fld id="{D936F25B-2EB7-4F2E-A375-7E2BED8EDC16}" type="datetimeFigureOut">
               <a:rPr lang="en-US" smtClean="0"/>
-              <a:t>3/17/2017</a:t>
+              <a:t>3/18/2017</a:t>
             </a:fld>
             <a:endParaRPr lang="en-US"/>
           </a:p>
@@ -1825,7 +1827,7 @@
           <a:p>
             <a:fld id="{D936F25B-2EB7-4F2E-A375-7E2BED8EDC16}" type="datetimeFigureOut">
               <a:rPr lang="en-US" smtClean="0"/>
-              <a:t>3/17/2017</a:t>
+              <a:t>3/18/2017</a:t>
             </a:fld>
             <a:endParaRPr lang="en-US"/>
           </a:p>
@@ -2100,7 +2102,7 @@
           <a:p>
             <a:fld id="{D936F25B-2EB7-4F2E-A375-7E2BED8EDC16}" type="datetimeFigureOut">
               <a:rPr lang="en-US" smtClean="0"/>
-              <a:t>3/17/2017</a:t>
+              <a:t>3/18/2017</a:t>
             </a:fld>
             <a:endParaRPr lang="en-US"/>
           </a:p>
@@ -2352,7 +2354,7 @@
           <a:p>
             <a:fld id="{D936F25B-2EB7-4F2E-A375-7E2BED8EDC16}" type="datetimeFigureOut">
               <a:rPr lang="en-US" smtClean="0"/>
-              <a:t>3/17/2017</a:t>
+              <a:t>3/18/2017</a:t>
             </a:fld>
             <a:endParaRPr lang="en-US"/>
           </a:p>
@@ -2563,7 +2565,7 @@
           <a:p>
             <a:fld id="{D936F25B-2EB7-4F2E-A375-7E2BED8EDC16}" type="datetimeFigureOut">
               <a:rPr lang="en-US" smtClean="0"/>
-              <a:t>3/17/2017</a:t>
+              <a:t>3/18/2017</a:t>
             </a:fld>
             <a:endParaRPr lang="en-US"/>
           </a:p>
@@ -3114,6 +3116,20 @@
             <a:r>
               <a:rPr lang="en-US" dirty="0"/>
               <a:t>You can use the same branch strategy as application code</a:t>
+            </a:r>
+          </a:p>
+          <a:p>
+            <a:pPr lvl="1"/>
+            <a:r>
+              <a:rPr lang="en-US" dirty="0"/>
+              <a:t>May want to reuse, not delete branches</a:t>
+            </a:r>
+          </a:p>
+          <a:p>
+            <a:pPr lvl="1"/>
+            <a:r>
+              <a:rPr lang="en-US" dirty="0"/>
+              <a:t>May rename databases if names matter</a:t>
             </a:r>
           </a:p>
           <a:p>
@@ -4383,7 +4399,7 @@
           <a:p>
             <a:r>
               <a:rPr lang="en-US" dirty="0"/>
-              <a:t>4.3 – Monitoring</a:t>
+              <a:t>4.3 – Provisioning</a:t>
             </a:r>
           </a:p>
         </p:txBody>
@@ -4391,7 +4407,7 @@
     </p:spTree>
     <p:extLst>
       <p:ext uri="{BB962C8B-B14F-4D97-AF65-F5344CB8AC3E}">
-        <p14:creationId xmlns:p14="http://schemas.microsoft.com/office/powerpoint/2010/main" val="3047148913"/>
+        <p14:creationId xmlns:p14="http://schemas.microsoft.com/office/powerpoint/2010/main" val="3308782382"/>
       </p:ext>
     </p:extLst>
   </p:cSld>
@@ -4435,7 +4451,7 @@
           <a:p>
             <a:r>
               <a:rPr lang="en-US" dirty="0"/>
-              <a:t>Monitoring Your Release</a:t>
+              <a:t>Provisioning Database Environments</a:t>
             </a:r>
           </a:p>
         </p:txBody>
@@ -4452,57 +4468,74 @@
         </p:nvSpPr>
         <p:spPr/>
         <p:txBody>
-          <a:bodyPr/>
-          <a:lstStyle/>
-          <a:p>
-            <a:r>
-              <a:rPr lang="en-US" dirty="0"/>
-              <a:t>Monitoring provides feedback (one of the Three Ways)</a:t>
-            </a:r>
-          </a:p>
-          <a:p>
-            <a:r>
-              <a:rPr lang="en-US" dirty="0"/>
-              <a:t>Gather metrics on</a:t>
+          <a:bodyPr>
+            <a:normAutofit lnSpcReduction="10000"/>
+          </a:bodyPr>
+          <a:lstStyle/>
+          <a:p>
+            <a:r>
+              <a:rPr lang="en-US" dirty="0"/>
+              <a:t>Use Automation</a:t>
             </a:r>
           </a:p>
           <a:p>
             <a:pPr lvl="1"/>
             <a:r>
               <a:rPr lang="en-US" dirty="0"/>
-              <a:t>Resources</a:t>
+              <a:t>PowerShell DSC</a:t>
             </a:r>
           </a:p>
           <a:p>
             <a:pPr lvl="1"/>
             <a:r>
               <a:rPr lang="en-US" dirty="0"/>
-              <a:t>Business counters</a:t>
+              <a:t>Chef</a:t>
             </a:r>
           </a:p>
           <a:p>
             <a:pPr lvl="1"/>
             <a:r>
               <a:rPr lang="en-US" dirty="0"/>
-              <a:t>Object usage (essentially feature usage)</a:t>
-            </a:r>
-          </a:p>
-          <a:p>
-            <a:r>
-              <a:rPr lang="en-US" dirty="0"/>
-              <a:t>Ensure deployment timestamps are captured in your monitoring tool</a:t>
-            </a:r>
-          </a:p>
-          <a:p>
-            <a:r>
-              <a:rPr lang="en-US" dirty="0"/>
-              <a:t>Be sure dark launches are really dark</a:t>
-            </a:r>
-          </a:p>
-          <a:p>
-            <a:r>
-              <a:rPr lang="en-US" dirty="0"/>
-              <a:t>Be sure the feedback gets back to both Dev and Ops</a:t>
+              <a:t>Puppet</a:t>
+            </a:r>
+          </a:p>
+          <a:p>
+            <a:r>
+              <a:rPr lang="en-US" dirty="0"/>
+              <a:t>All environments should be configured the same (in general)</a:t>
+            </a:r>
+          </a:p>
+          <a:p>
+            <a:pPr lvl="1"/>
+            <a:r>
+              <a:rPr lang="en-US" dirty="0"/>
+              <a:t>Dev == QA == Staging == Production</a:t>
+            </a:r>
+          </a:p>
+          <a:p>
+            <a:pPr lvl="1"/>
+            <a:r>
+              <a:rPr lang="en-US" dirty="0"/>
+              <a:t>Differences should be easily  handled in automation tools</a:t>
+            </a:r>
+          </a:p>
+          <a:p>
+            <a:r>
+              <a:rPr lang="en-US" dirty="0"/>
+              <a:t>Builds Confidence</a:t>
+            </a:r>
+          </a:p>
+          <a:p>
+            <a:r>
+              <a:rPr lang="en-US" dirty="0"/>
+              <a:t>Databases are cattle</a:t>
+            </a:r>
+          </a:p>
+          <a:p>
+            <a:pPr lvl="1"/>
+            <a:r>
+              <a:rPr lang="en-US" dirty="0"/>
+              <a:t>Any environment can be replaced</a:t>
             </a:r>
           </a:p>
         </p:txBody>
@@ -4510,7 +4543,7 @@
     </p:spTree>
     <p:extLst>
       <p:ext uri="{BB962C8B-B14F-4D97-AF65-F5344CB8AC3E}">
-        <p14:creationId xmlns:p14="http://schemas.microsoft.com/office/powerpoint/2010/main" val="2466081738"/>
+        <p14:creationId xmlns:p14="http://schemas.microsoft.com/office/powerpoint/2010/main" val="3188473765"/>
       </p:ext>
     </p:extLst>
   </p:cSld>
@@ -4539,12 +4572,12 @@
       </p:grpSpPr>
       <p:sp>
         <p:nvSpPr>
-          <p:cNvPr id="4" name="Title 3"/>
-          <p:cNvSpPr>
-            <a:spLocks noGrp="1"/>
-          </p:cNvSpPr>
-          <p:nvPr>
-            <p:ph type="ctrTitle"/>
+          <p:cNvPr id="2" name="Title 1"/>
+          <p:cNvSpPr>
+            <a:spLocks noGrp="1"/>
+          </p:cNvSpPr>
+          <p:nvPr>
+            <p:ph type="title"/>
           </p:nvPr>
         </p:nvSpPr>
         <p:spPr/>
@@ -4554,15 +4587,97 @@
           <a:p>
             <a:r>
               <a:rPr lang="en-US" dirty="0"/>
-              <a:t>4.4 – Provisioning</a:t>
-            </a:r>
+              <a:t>Provisioning Database Environments</a:t>
+            </a:r>
+          </a:p>
+        </p:txBody>
+      </p:sp>
+      <p:sp>
+        <p:nvSpPr>
+          <p:cNvPr id="3" name="Content Placeholder 2"/>
+          <p:cNvSpPr>
+            <a:spLocks noGrp="1"/>
+          </p:cNvSpPr>
+          <p:nvPr>
+            <p:ph idx="1"/>
+          </p:nvPr>
+        </p:nvSpPr>
+        <p:spPr/>
+        <p:txBody>
+          <a:bodyPr>
+            <a:normAutofit/>
+          </a:bodyPr>
+          <a:lstStyle/>
+          <a:p>
+            <a:r>
+              <a:rPr lang="en-US" dirty="0"/>
+              <a:t>Two Issues with data</a:t>
+            </a:r>
+          </a:p>
+          <a:p>
+            <a:pPr lvl="1"/>
+            <a:r>
+              <a:rPr lang="en-US" dirty="0"/>
+              <a:t>Scale (data set size)</a:t>
+            </a:r>
+          </a:p>
+          <a:p>
+            <a:pPr lvl="1"/>
+            <a:r>
+              <a:rPr lang="en-US" dirty="0"/>
+              <a:t>Sensitivity (PII, medical, financial, etc.)</a:t>
+            </a:r>
+          </a:p>
+          <a:p>
+            <a:r>
+              <a:rPr lang="en-US" dirty="0"/>
+              <a:t>Seeding data</a:t>
+            </a:r>
+          </a:p>
+          <a:p>
+            <a:pPr lvl="1"/>
+            <a:r>
+              <a:rPr lang="en-US" dirty="0"/>
+              <a:t>Copying existing databases (backup/restore, snapshot, clone, etc.)</a:t>
+            </a:r>
+          </a:p>
+          <a:p>
+            <a:pPr lvl="1"/>
+            <a:r>
+              <a:rPr lang="en-US" dirty="0"/>
+              <a:t>Using test data scripts</a:t>
+            </a:r>
+          </a:p>
+          <a:p>
+            <a:r>
+              <a:rPr lang="en-US" dirty="0"/>
+              <a:t>Speed</a:t>
+            </a:r>
+          </a:p>
+          <a:p>
+            <a:pPr lvl="1"/>
+            <a:r>
+              <a:rPr lang="en-US" dirty="0"/>
+              <a:t>We don’t want developers waiting.</a:t>
+            </a:r>
+          </a:p>
+          <a:p>
+            <a:pPr lvl="1"/>
+            <a:r>
+              <a:rPr lang="en-US" dirty="0"/>
+              <a:t>We want this easy so developers use this</a:t>
+            </a:r>
+          </a:p>
+          <a:p>
+            <a:pPr lvl="1"/>
+            <a:endParaRPr lang="en-US" dirty="0"/>
           </a:p>
         </p:txBody>
       </p:sp>
     </p:spTree>
     <p:extLst>
       <p:ext uri="{BB962C8B-B14F-4D97-AF65-F5344CB8AC3E}">
-        <p14:creationId xmlns:p14="http://schemas.microsoft.com/office/powerpoint/2010/main" val="3308782382"/>
+        <p14:creationId xmlns:p14="http://schemas.microsoft.com/office/powerpoint/2010/main" val="3355764968"/>
       </p:ext>
     </p:extLst>
   </p:cSld>
@@ -4591,12 +4706,12 @@
       </p:grpSpPr>
       <p:sp>
         <p:nvSpPr>
-          <p:cNvPr id="2" name="Title 1"/>
-          <p:cNvSpPr>
-            <a:spLocks noGrp="1"/>
-          </p:cNvSpPr>
-          <p:nvPr>
-            <p:ph type="title"/>
+          <p:cNvPr id="4" name="Title 3"/>
+          <p:cNvSpPr>
+            <a:spLocks noGrp="1"/>
+          </p:cNvSpPr>
+          <p:nvPr>
+            <p:ph type="ctrTitle"/>
           </p:nvPr>
         </p:nvSpPr>
         <p:spPr/>
@@ -4606,91 +4721,7 @@
           <a:p>
             <a:r>
               <a:rPr lang="en-US" dirty="0"/>
-              <a:t>Provisioning Database Environments</a:t>
-            </a:r>
-          </a:p>
-        </p:txBody>
-      </p:sp>
-      <p:sp>
-        <p:nvSpPr>
-          <p:cNvPr id="3" name="Content Placeholder 2"/>
-          <p:cNvSpPr>
-            <a:spLocks noGrp="1"/>
-          </p:cNvSpPr>
-          <p:nvPr>
-            <p:ph idx="1"/>
-          </p:nvPr>
-        </p:nvSpPr>
-        <p:spPr/>
-        <p:txBody>
-          <a:bodyPr>
-            <a:normAutofit lnSpcReduction="10000"/>
-          </a:bodyPr>
-          <a:lstStyle/>
-          <a:p>
-            <a:r>
-              <a:rPr lang="en-US" dirty="0"/>
-              <a:t>Use Automation</a:t>
-            </a:r>
-          </a:p>
-          <a:p>
-            <a:pPr lvl="1"/>
-            <a:r>
-              <a:rPr lang="en-US" dirty="0"/>
-              <a:t>PowerShell DSC</a:t>
-            </a:r>
-          </a:p>
-          <a:p>
-            <a:pPr lvl="1"/>
-            <a:r>
-              <a:rPr lang="en-US" dirty="0"/>
-              <a:t>Chef</a:t>
-            </a:r>
-          </a:p>
-          <a:p>
-            <a:pPr lvl="1"/>
-            <a:r>
-              <a:rPr lang="en-US" dirty="0"/>
-              <a:t>Puppet</a:t>
-            </a:r>
-          </a:p>
-          <a:p>
-            <a:r>
-              <a:rPr lang="en-US" dirty="0"/>
-              <a:t>All environments should be configured the same (in general)</a:t>
-            </a:r>
-          </a:p>
-          <a:p>
-            <a:pPr lvl="1"/>
-            <a:r>
-              <a:rPr lang="en-US" dirty="0"/>
-              <a:t>Dev == QA == Staging == Production</a:t>
-            </a:r>
-          </a:p>
-          <a:p>
-            <a:pPr lvl="1"/>
-            <a:r>
-              <a:rPr lang="en-US" dirty="0"/>
-              <a:t>Differences should be easily  handled in automation tools</a:t>
-            </a:r>
-          </a:p>
-          <a:p>
-            <a:r>
-              <a:rPr lang="en-US" dirty="0"/>
-              <a:t>Builds Confidence</a:t>
-            </a:r>
-          </a:p>
-          <a:p>
-            <a:r>
-              <a:rPr lang="en-US" dirty="0"/>
-              <a:t>Databases are cattle</a:t>
-            </a:r>
-          </a:p>
-          <a:p>
-            <a:pPr lvl="1"/>
-            <a:r>
-              <a:rPr lang="en-US" dirty="0"/>
-              <a:t>Any environment can be replaced</a:t>
+              <a:t>4.4 – Monitoring</a:t>
             </a:r>
           </a:p>
         </p:txBody>
@@ -4698,7 +4729,7 @@
     </p:spTree>
     <p:extLst>
       <p:ext uri="{BB962C8B-B14F-4D97-AF65-F5344CB8AC3E}">
-        <p14:creationId xmlns:p14="http://schemas.microsoft.com/office/powerpoint/2010/main" val="3188473765"/>
+        <p14:creationId xmlns:p14="http://schemas.microsoft.com/office/powerpoint/2010/main" val="3047148913"/>
       </p:ext>
     </p:extLst>
   </p:cSld>
@@ -4727,6 +4758,125 @@
       </p:grpSpPr>
       <p:sp>
         <p:nvSpPr>
+          <p:cNvPr id="2" name="Title 1"/>
+          <p:cNvSpPr>
+            <a:spLocks noGrp="1"/>
+          </p:cNvSpPr>
+          <p:nvPr>
+            <p:ph type="title"/>
+          </p:nvPr>
+        </p:nvSpPr>
+        <p:spPr/>
+        <p:txBody>
+          <a:bodyPr/>
+          <a:lstStyle/>
+          <a:p>
+            <a:r>
+              <a:rPr lang="en-US" dirty="0"/>
+              <a:t>Monitoring Your Release</a:t>
+            </a:r>
+          </a:p>
+        </p:txBody>
+      </p:sp>
+      <p:sp>
+        <p:nvSpPr>
+          <p:cNvPr id="3" name="Content Placeholder 2"/>
+          <p:cNvSpPr>
+            <a:spLocks noGrp="1"/>
+          </p:cNvSpPr>
+          <p:nvPr>
+            <p:ph idx="1"/>
+          </p:nvPr>
+        </p:nvSpPr>
+        <p:spPr/>
+        <p:txBody>
+          <a:bodyPr/>
+          <a:lstStyle/>
+          <a:p>
+            <a:r>
+              <a:rPr lang="en-US" dirty="0"/>
+              <a:t>Monitoring provides feedback (one of the Three Ways)</a:t>
+            </a:r>
+          </a:p>
+          <a:p>
+            <a:r>
+              <a:rPr lang="en-US" dirty="0"/>
+              <a:t>Gather metrics on</a:t>
+            </a:r>
+          </a:p>
+          <a:p>
+            <a:pPr lvl="1"/>
+            <a:r>
+              <a:rPr lang="en-US" dirty="0"/>
+              <a:t>Resources</a:t>
+            </a:r>
+          </a:p>
+          <a:p>
+            <a:pPr lvl="1"/>
+            <a:r>
+              <a:rPr lang="en-US" dirty="0"/>
+              <a:t>Business counters</a:t>
+            </a:r>
+          </a:p>
+          <a:p>
+            <a:pPr lvl="1"/>
+            <a:r>
+              <a:rPr lang="en-US" dirty="0"/>
+              <a:t>Object usage (essentially feature usage)</a:t>
+            </a:r>
+          </a:p>
+          <a:p>
+            <a:r>
+              <a:rPr lang="en-US" dirty="0"/>
+              <a:t>Ensure deployment timestamps are captured in your monitoring tool</a:t>
+            </a:r>
+          </a:p>
+          <a:p>
+            <a:r>
+              <a:rPr lang="en-US" dirty="0"/>
+              <a:t>Be sure dark launches are really dark</a:t>
+            </a:r>
+          </a:p>
+          <a:p>
+            <a:r>
+              <a:rPr lang="en-US" dirty="0"/>
+              <a:t>Be sure the feedback gets back to both Dev and Ops</a:t>
+            </a:r>
+          </a:p>
+        </p:txBody>
+      </p:sp>
+    </p:spTree>
+    <p:extLst>
+      <p:ext uri="{BB962C8B-B14F-4D97-AF65-F5344CB8AC3E}">
+        <p14:creationId xmlns:p14="http://schemas.microsoft.com/office/powerpoint/2010/main" val="2466081738"/>
+      </p:ext>
+    </p:extLst>
+  </p:cSld>
+  <p:clrMapOvr>
+    <a:masterClrMapping/>
+  </p:clrMapOvr>
+</p:sld>
+</file>
+
+<file path=ppt/slides/slide18.xml><?xml version="1.0" encoding="utf-8"?>
+<p:sld xmlns:a="http://schemas.openxmlformats.org/drawingml/2006/main" xmlns:r="http://schemas.openxmlformats.org/officeDocument/2006/relationships" xmlns:p="http://schemas.openxmlformats.org/presentationml/2006/main">
+  <p:cSld>
+    <p:spTree>
+      <p:nvGrpSpPr>
+        <p:cNvPr id="1" name=""/>
+        <p:cNvGrpSpPr/>
+        <p:nvPr/>
+      </p:nvGrpSpPr>
+      <p:grpSpPr>
+        <a:xfrm>
+          <a:off x="0" y="0"/>
+          <a:ext cx="0" cy="0"/>
+          <a:chOff x="0" y="0"/>
+          <a:chExt cx="0" cy="0"/>
+        </a:xfrm>
+      </p:grpSpPr>
+      <p:sp>
+        <p:nvSpPr>
           <p:cNvPr id="4" name="Title 3"/>
           <p:cNvSpPr>
             <a:spLocks noGrp="1"/>
@@ -4760,7 +4910,7 @@
 </p:sld>
 </file>
 
-<file path=ppt/slides/slide18.xml><?xml version="1.0" encoding="utf-8"?>
+<file path=ppt/slides/slide19.xml><?xml version="1.0" encoding="utf-8"?>
 <p:sld xmlns:a="http://schemas.openxmlformats.org/drawingml/2006/main" xmlns:r="http://schemas.openxmlformats.org/officeDocument/2006/relationships" xmlns:p="http://schemas.openxmlformats.org/presentationml/2006/main">
   <p:cSld>
     <p:spTree>
@@ -5003,7 +5153,7 @@
           <a:p>
             <a:r>
               <a:rPr lang="en-US" dirty="0"/>
-              <a:t>V1.1</a:t>
+              <a:t>V2.0</a:t>
             </a:r>
           </a:p>
         </p:txBody>
@@ -5032,7 +5182,7 @@
           <a:p>
             <a:r>
               <a:rPr lang="en-US" dirty="0"/>
-              <a:t>V2.0</a:t>
+              <a:t>V2.1</a:t>
             </a:r>
           </a:p>
         </p:txBody>
@@ -5061,7 +5211,7 @@
           <a:p>
             <a:r>
               <a:rPr lang="en-US" dirty="0"/>
-              <a:t>V2.2</a:t>
+              <a:t>V3.0</a:t>
             </a:r>
           </a:p>
         </p:txBody>
@@ -5199,7 +5349,992 @@
 </p:sld>
 </file>
 
-<file path=ppt/slides/slide19.xml><?xml version="1.0" encoding="utf-8"?>
+<file path=ppt/slides/slide2.xml><?xml version="1.0" encoding="utf-8"?>
+<p:sld xmlns:a="http://schemas.openxmlformats.org/drawingml/2006/main" xmlns:r="http://schemas.openxmlformats.org/officeDocument/2006/relationships" xmlns:p="http://schemas.openxmlformats.org/presentationml/2006/main">
+  <p:cSld>
+    <p:spTree>
+      <p:nvGrpSpPr>
+        <p:cNvPr id="1" name=""/>
+        <p:cNvGrpSpPr/>
+        <p:nvPr/>
+      </p:nvGrpSpPr>
+      <p:grpSpPr>
+        <a:xfrm>
+          <a:off x="0" y="0"/>
+          <a:ext cx="0" cy="0"/>
+          <a:chOff x="0" y="0"/>
+          <a:chExt cx="0" cy="0"/>
+        </a:xfrm>
+      </p:grpSpPr>
+      <p:sp>
+        <p:nvSpPr>
+          <p:cNvPr id="4" name="Title 3"/>
+          <p:cNvSpPr>
+            <a:spLocks noGrp="1"/>
+          </p:cNvSpPr>
+          <p:nvPr>
+            <p:ph type="ctrTitle"/>
+          </p:nvPr>
+        </p:nvSpPr>
+        <p:spPr/>
+        <p:txBody>
+          <a:bodyPr/>
+          <a:lstStyle/>
+          <a:p>
+            <a:r>
+              <a:rPr lang="en-US" dirty="0"/>
+              <a:t>4.1 – Best Practices</a:t>
+            </a:r>
+          </a:p>
+        </p:txBody>
+      </p:sp>
+      <p:sp>
+        <p:nvSpPr>
+          <p:cNvPr id="5" name="Subtitle 4"/>
+          <p:cNvSpPr>
+            <a:spLocks noGrp="1"/>
+          </p:cNvSpPr>
+          <p:nvPr>
+            <p:ph type="subTitle" idx="1"/>
+          </p:nvPr>
+        </p:nvSpPr>
+        <p:spPr/>
+        <p:txBody>
+          <a:bodyPr/>
+          <a:lstStyle/>
+          <a:p>
+            <a:endParaRPr lang="en-US"/>
+          </a:p>
+        </p:txBody>
+      </p:sp>
+    </p:spTree>
+    <p:extLst>
+      <p:ext uri="{BB962C8B-B14F-4D97-AF65-F5344CB8AC3E}">
+        <p14:creationId xmlns:p14="http://schemas.microsoft.com/office/powerpoint/2010/main" val="4212081847"/>
+      </p:ext>
+    </p:extLst>
+  </p:cSld>
+  <p:clrMapOvr>
+    <a:masterClrMapping/>
+  </p:clrMapOvr>
+</p:sld>
+</file>
+
+<file path=ppt/slides/slide20.xml><?xml version="1.0" encoding="utf-8"?>
+<p:sld xmlns:a="http://schemas.openxmlformats.org/drawingml/2006/main" xmlns:r="http://schemas.openxmlformats.org/officeDocument/2006/relationships" xmlns:p="http://schemas.openxmlformats.org/presentationml/2006/main">
+  <p:cSld>
+    <p:spTree>
+      <p:nvGrpSpPr>
+        <p:cNvPr id="1" name=""/>
+        <p:cNvGrpSpPr/>
+        <p:nvPr/>
+      </p:nvGrpSpPr>
+      <p:grpSpPr>
+        <a:xfrm>
+          <a:off x="0" y="0"/>
+          <a:ext cx="0" cy="0"/>
+          <a:chOff x="0" y="0"/>
+          <a:chExt cx="0" cy="0"/>
+        </a:xfrm>
+      </p:grpSpPr>
+      <p:sp>
+        <p:nvSpPr>
+          <p:cNvPr id="2" name="Title 1"/>
+          <p:cNvSpPr>
+            <a:spLocks noGrp="1"/>
+          </p:cNvSpPr>
+          <p:nvPr>
+            <p:ph type="title"/>
+          </p:nvPr>
+        </p:nvSpPr>
+        <p:spPr/>
+        <p:txBody>
+          <a:bodyPr/>
+          <a:lstStyle/>
+          <a:p>
+            <a:r>
+              <a:rPr lang="en-US" dirty="0"/>
+              <a:t>Dealing with Disparate Environments</a:t>
+            </a:r>
+          </a:p>
+        </p:txBody>
+      </p:sp>
+      <p:sp>
+        <p:nvSpPr>
+          <p:cNvPr id="12" name="Content Placeholder 11"/>
+          <p:cNvSpPr>
+            <a:spLocks noGrp="1"/>
+          </p:cNvSpPr>
+          <p:nvPr>
+            <p:ph idx="1"/>
+          </p:nvPr>
+        </p:nvSpPr>
+        <p:spPr>
+          <a:xfrm>
+            <a:off x="838200" y="1825625"/>
+            <a:ext cx="2292927" cy="594302"/>
+          </a:xfrm>
+        </p:spPr>
+        <p:txBody>
+          <a:bodyPr/>
+          <a:lstStyle/>
+          <a:p>
+            <a:pPr marL="0" indent="0">
+              <a:buNone/>
+            </a:pPr>
+            <a:r>
+              <a:rPr lang="en-US" dirty="0"/>
+              <a:t>Customer A</a:t>
+            </a:r>
+          </a:p>
+        </p:txBody>
+      </p:sp>
+      <p:pic>
+        <p:nvPicPr>
+          <p:cNvPr id="16" name="Picture 15"/>
+          <p:cNvPicPr>
+            <a:picLocks noChangeAspect="1"/>
+          </p:cNvPicPr>
+          <p:nvPr/>
+        </p:nvPicPr>
+        <p:blipFill>
+          <a:blip r:embed="rId2"/>
+          <a:stretch>
+            <a:fillRect/>
+          </a:stretch>
+        </p:blipFill>
+        <p:spPr>
+          <a:xfrm>
+            <a:off x="4060906" y="1557368"/>
+            <a:ext cx="946169" cy="1271518"/>
+          </a:xfrm>
+          <a:prstGeom prst="rect">
+            <a:avLst/>
+          </a:prstGeom>
+        </p:spPr>
+      </p:pic>
+      <p:pic>
+        <p:nvPicPr>
+          <p:cNvPr id="17" name="Picture 16"/>
+          <p:cNvPicPr>
+            <a:picLocks noChangeAspect="1"/>
+          </p:cNvPicPr>
+          <p:nvPr/>
+        </p:nvPicPr>
+        <p:blipFill>
+          <a:blip r:embed="rId2"/>
+          <a:stretch>
+            <a:fillRect/>
+          </a:stretch>
+        </p:blipFill>
+        <p:spPr>
+          <a:xfrm>
+            <a:off x="5631308" y="1557368"/>
+            <a:ext cx="946169" cy="1271518"/>
+          </a:xfrm>
+          <a:prstGeom prst="rect">
+            <a:avLst/>
+          </a:prstGeom>
+        </p:spPr>
+      </p:pic>
+      <p:sp>
+        <p:nvSpPr>
+          <p:cNvPr id="18" name="TextBox 17"/>
+          <p:cNvSpPr txBox="1"/>
+          <p:nvPr/>
+        </p:nvSpPr>
+        <p:spPr>
+          <a:xfrm>
+            <a:off x="4168217" y="2859568"/>
+            <a:ext cx="1118039" cy="369332"/>
+          </a:xfrm>
+          <a:prstGeom prst="rect">
+            <a:avLst/>
+          </a:prstGeom>
+          <a:noFill/>
+        </p:spPr>
+        <p:txBody>
+          <a:bodyPr wrap="square" rtlCol="0">
+            <a:spAutoFit/>
+          </a:bodyPr>
+          <a:lstStyle/>
+          <a:p>
+            <a:r>
+              <a:rPr lang="en-US" dirty="0"/>
+              <a:t>V2.1</a:t>
+            </a:r>
+          </a:p>
+        </p:txBody>
+      </p:sp>
+      <p:sp>
+        <p:nvSpPr>
+          <p:cNvPr id="19" name="TextBox 18"/>
+          <p:cNvSpPr txBox="1"/>
+          <p:nvPr/>
+        </p:nvSpPr>
+        <p:spPr>
+          <a:xfrm>
+            <a:off x="5832792" y="2859568"/>
+            <a:ext cx="1118039" cy="369332"/>
+          </a:xfrm>
+          <a:prstGeom prst="rect">
+            <a:avLst/>
+          </a:prstGeom>
+          <a:noFill/>
+        </p:spPr>
+        <p:txBody>
+          <a:bodyPr wrap="square" rtlCol="0">
+            <a:spAutoFit/>
+          </a:bodyPr>
+          <a:lstStyle/>
+          <a:p>
+            <a:r>
+              <a:rPr lang="en-US" dirty="0"/>
+              <a:t>V3.0</a:t>
+            </a:r>
+          </a:p>
+        </p:txBody>
+      </p:sp>
+      <p:sp>
+        <p:nvSpPr>
+          <p:cNvPr id="23" name="Arrow: Right 22"/>
+          <p:cNvSpPr/>
+          <p:nvPr/>
+        </p:nvSpPr>
+        <p:spPr>
+          <a:xfrm>
+            <a:off x="5090591" y="2031160"/>
+            <a:ext cx="457200" cy="248478"/>
+          </a:xfrm>
+          <a:prstGeom prst="rightArrow">
+            <a:avLst/>
+          </a:prstGeom>
+        </p:spPr>
+        <p:style>
+          <a:lnRef idx="2">
+            <a:schemeClr val="accent1">
+              <a:shade val="50000"/>
+            </a:schemeClr>
+          </a:lnRef>
+          <a:fillRef idx="1">
+            <a:schemeClr val="accent1"/>
+          </a:fillRef>
+          <a:effectRef idx="0">
+            <a:schemeClr val="accent1"/>
+          </a:effectRef>
+          <a:fontRef idx="minor">
+            <a:schemeClr val="lt1"/>
+          </a:fontRef>
+        </p:style>
+        <p:txBody>
+          <a:bodyPr rtlCol="0" anchor="ctr"/>
+          <a:lstStyle/>
+          <a:p>
+            <a:pPr algn="ctr"/>
+            <a:endParaRPr lang="en-US"/>
+          </a:p>
+        </p:txBody>
+      </p:sp>
+      <p:sp>
+        <p:nvSpPr>
+          <p:cNvPr id="24" name="Content Placeholder 11"/>
+          <p:cNvSpPr txBox="1">
+            <a:spLocks/>
+          </p:cNvSpPr>
+          <p:nvPr/>
+        </p:nvSpPr>
+        <p:spPr>
+          <a:xfrm>
+            <a:off x="838200" y="3538965"/>
+            <a:ext cx="2292927" cy="594302"/>
+          </a:xfrm>
+          <a:prstGeom prst="rect">
+            <a:avLst/>
+          </a:prstGeom>
+        </p:spPr>
+        <p:txBody>
+          <a:bodyPr vert="horz" lIns="91440" tIns="45720" rIns="91440" bIns="45720" rtlCol="0">
+            <a:normAutofit/>
+          </a:bodyPr>
+          <a:lstStyle>
+            <a:lvl1pPr marL="228600" indent="-228600" algn="l" defTabSz="914400" rtl="0" eaLnBrk="1" latinLnBrk="0" hangingPunct="1">
+              <a:lnSpc>
+                <a:spcPct val="90000"/>
+              </a:lnSpc>
+              <a:spcBef>
+                <a:spcPts val="1000"/>
+              </a:spcBef>
+              <a:buFont typeface="Arial" panose="020B0604020202020204" pitchFamily="34" charset="0"/>
+              <a:buChar char="•"/>
+              <a:defRPr sz="2800" kern="1200">
+                <a:solidFill>
+                  <a:schemeClr val="tx1"/>
+                </a:solidFill>
+                <a:latin typeface="+mn-lt"/>
+                <a:ea typeface="+mn-ea"/>
+                <a:cs typeface="+mn-cs"/>
+              </a:defRPr>
+            </a:lvl1pPr>
+            <a:lvl2pPr marL="685800" indent="-228600" algn="l" defTabSz="914400" rtl="0" eaLnBrk="1" latinLnBrk="0" hangingPunct="1">
+              <a:lnSpc>
+                <a:spcPct val="90000"/>
+              </a:lnSpc>
+              <a:spcBef>
+                <a:spcPts val="500"/>
+              </a:spcBef>
+              <a:buFont typeface="Arial" panose="020B0604020202020204" pitchFamily="34" charset="0"/>
+              <a:buChar char="•"/>
+              <a:defRPr sz="2400" kern="1200">
+                <a:solidFill>
+                  <a:schemeClr val="tx1"/>
+                </a:solidFill>
+                <a:latin typeface="+mn-lt"/>
+                <a:ea typeface="+mn-ea"/>
+                <a:cs typeface="+mn-cs"/>
+              </a:defRPr>
+            </a:lvl2pPr>
+            <a:lvl3pPr marL="1143000" indent="-228600" algn="l" defTabSz="914400" rtl="0" eaLnBrk="1" latinLnBrk="0" hangingPunct="1">
+              <a:lnSpc>
+                <a:spcPct val="90000"/>
+              </a:lnSpc>
+              <a:spcBef>
+                <a:spcPts val="500"/>
+              </a:spcBef>
+              <a:buFont typeface="Arial" panose="020B0604020202020204" pitchFamily="34" charset="0"/>
+              <a:buChar char="•"/>
+              <a:defRPr sz="2000" kern="1200">
+                <a:solidFill>
+                  <a:schemeClr val="tx1"/>
+                </a:solidFill>
+                <a:latin typeface="+mn-lt"/>
+                <a:ea typeface="+mn-ea"/>
+                <a:cs typeface="+mn-cs"/>
+              </a:defRPr>
+            </a:lvl3pPr>
+            <a:lvl4pPr marL="1600200" indent="-228600" algn="l" defTabSz="914400" rtl="0" eaLnBrk="1" latinLnBrk="0" hangingPunct="1">
+              <a:lnSpc>
+                <a:spcPct val="90000"/>
+              </a:lnSpc>
+              <a:spcBef>
+                <a:spcPts val="500"/>
+              </a:spcBef>
+              <a:buFont typeface="Arial" panose="020B0604020202020204" pitchFamily="34" charset="0"/>
+              <a:buChar char="•"/>
+              <a:defRPr sz="1800" kern="1200">
+                <a:solidFill>
+                  <a:schemeClr val="tx1"/>
+                </a:solidFill>
+                <a:latin typeface="+mn-lt"/>
+                <a:ea typeface="+mn-ea"/>
+                <a:cs typeface="+mn-cs"/>
+              </a:defRPr>
+            </a:lvl4pPr>
+            <a:lvl5pPr marL="2057400" indent="-228600" algn="l" defTabSz="914400" rtl="0" eaLnBrk="1" latinLnBrk="0" hangingPunct="1">
+              <a:lnSpc>
+                <a:spcPct val="90000"/>
+              </a:lnSpc>
+              <a:spcBef>
+                <a:spcPts val="500"/>
+              </a:spcBef>
+              <a:buFont typeface="Arial" panose="020B0604020202020204" pitchFamily="34" charset="0"/>
+              <a:buChar char="•"/>
+              <a:defRPr sz="1800" kern="1200">
+                <a:solidFill>
+                  <a:schemeClr val="tx1"/>
+                </a:solidFill>
+                <a:latin typeface="+mn-lt"/>
+                <a:ea typeface="+mn-ea"/>
+                <a:cs typeface="+mn-cs"/>
+              </a:defRPr>
+            </a:lvl5pPr>
+            <a:lvl6pPr marL="2514600" indent="-228600" algn="l" defTabSz="914400" rtl="0" eaLnBrk="1" latinLnBrk="0" hangingPunct="1">
+              <a:lnSpc>
+                <a:spcPct val="90000"/>
+              </a:lnSpc>
+              <a:spcBef>
+                <a:spcPts val="500"/>
+              </a:spcBef>
+              <a:buFont typeface="Arial" panose="020B0604020202020204" pitchFamily="34" charset="0"/>
+              <a:buChar char="•"/>
+              <a:defRPr sz="1800" kern="1200">
+                <a:solidFill>
+                  <a:schemeClr val="tx1"/>
+                </a:solidFill>
+                <a:latin typeface="+mn-lt"/>
+                <a:ea typeface="+mn-ea"/>
+                <a:cs typeface="+mn-cs"/>
+              </a:defRPr>
+            </a:lvl6pPr>
+            <a:lvl7pPr marL="2971800" indent="-228600" algn="l" defTabSz="914400" rtl="0" eaLnBrk="1" latinLnBrk="0" hangingPunct="1">
+              <a:lnSpc>
+                <a:spcPct val="90000"/>
+              </a:lnSpc>
+              <a:spcBef>
+                <a:spcPts val="500"/>
+              </a:spcBef>
+              <a:buFont typeface="Arial" panose="020B0604020202020204" pitchFamily="34" charset="0"/>
+              <a:buChar char="•"/>
+              <a:defRPr sz="1800" kern="1200">
+                <a:solidFill>
+                  <a:schemeClr val="tx1"/>
+                </a:solidFill>
+                <a:latin typeface="+mn-lt"/>
+                <a:ea typeface="+mn-ea"/>
+                <a:cs typeface="+mn-cs"/>
+              </a:defRPr>
+            </a:lvl7pPr>
+            <a:lvl8pPr marL="3429000" indent="-228600" algn="l" defTabSz="914400" rtl="0" eaLnBrk="1" latinLnBrk="0" hangingPunct="1">
+              <a:lnSpc>
+                <a:spcPct val="90000"/>
+              </a:lnSpc>
+              <a:spcBef>
+                <a:spcPts val="500"/>
+              </a:spcBef>
+              <a:buFont typeface="Arial" panose="020B0604020202020204" pitchFamily="34" charset="0"/>
+              <a:buChar char="•"/>
+              <a:defRPr sz="1800" kern="1200">
+                <a:solidFill>
+                  <a:schemeClr val="tx1"/>
+                </a:solidFill>
+                <a:latin typeface="+mn-lt"/>
+                <a:ea typeface="+mn-ea"/>
+                <a:cs typeface="+mn-cs"/>
+              </a:defRPr>
+            </a:lvl8pPr>
+            <a:lvl9pPr marL="3886200" indent="-228600" algn="l" defTabSz="914400" rtl="0" eaLnBrk="1" latinLnBrk="0" hangingPunct="1">
+              <a:lnSpc>
+                <a:spcPct val="90000"/>
+              </a:lnSpc>
+              <a:spcBef>
+                <a:spcPts val="500"/>
+              </a:spcBef>
+              <a:buFont typeface="Arial" panose="020B0604020202020204" pitchFamily="34" charset="0"/>
+              <a:buChar char="•"/>
+              <a:defRPr sz="1800" kern="1200">
+                <a:solidFill>
+                  <a:schemeClr val="tx1"/>
+                </a:solidFill>
+                <a:latin typeface="+mn-lt"/>
+                <a:ea typeface="+mn-ea"/>
+                <a:cs typeface="+mn-cs"/>
+              </a:defRPr>
+            </a:lvl9pPr>
+          </a:lstStyle>
+          <a:p>
+            <a:pPr marL="0" indent="0">
+              <a:buFont typeface="Arial" panose="020B0604020202020204" pitchFamily="34" charset="0"/>
+              <a:buNone/>
+            </a:pPr>
+            <a:r>
+              <a:rPr lang="en-US" dirty="0"/>
+              <a:t>Customer B</a:t>
+            </a:r>
+          </a:p>
+        </p:txBody>
+      </p:sp>
+      <p:pic>
+        <p:nvPicPr>
+          <p:cNvPr id="25" name="Picture 24"/>
+          <p:cNvPicPr>
+            <a:picLocks noChangeAspect="1"/>
+          </p:cNvPicPr>
+          <p:nvPr/>
+        </p:nvPicPr>
+        <p:blipFill>
+          <a:blip r:embed="rId2"/>
+          <a:stretch>
+            <a:fillRect/>
+          </a:stretch>
+        </p:blipFill>
+        <p:spPr>
+          <a:xfrm>
+            <a:off x="4056290" y="3307655"/>
+            <a:ext cx="946169" cy="1271518"/>
+          </a:xfrm>
+          <a:prstGeom prst="rect">
+            <a:avLst/>
+          </a:prstGeom>
+        </p:spPr>
+      </p:pic>
+      <p:pic>
+        <p:nvPicPr>
+          <p:cNvPr id="26" name="Picture 25"/>
+          <p:cNvPicPr>
+            <a:picLocks noChangeAspect="1"/>
+          </p:cNvPicPr>
+          <p:nvPr/>
+        </p:nvPicPr>
+        <p:blipFill>
+          <a:blip r:embed="rId2"/>
+          <a:stretch>
+            <a:fillRect/>
+          </a:stretch>
+        </p:blipFill>
+        <p:spPr>
+          <a:xfrm>
+            <a:off x="5626692" y="3307655"/>
+            <a:ext cx="946169" cy="1271518"/>
+          </a:xfrm>
+          <a:prstGeom prst="rect">
+            <a:avLst/>
+          </a:prstGeom>
+        </p:spPr>
+      </p:pic>
+      <p:sp>
+        <p:nvSpPr>
+          <p:cNvPr id="27" name="TextBox 26"/>
+          <p:cNvSpPr txBox="1"/>
+          <p:nvPr/>
+        </p:nvSpPr>
+        <p:spPr>
+          <a:xfrm>
+            <a:off x="4163601" y="4609855"/>
+            <a:ext cx="1118039" cy="369332"/>
+          </a:xfrm>
+          <a:prstGeom prst="rect">
+            <a:avLst/>
+          </a:prstGeom>
+          <a:noFill/>
+        </p:spPr>
+        <p:txBody>
+          <a:bodyPr wrap="square" rtlCol="0">
+            <a:spAutoFit/>
+          </a:bodyPr>
+          <a:lstStyle/>
+          <a:p>
+            <a:r>
+              <a:rPr lang="en-US" dirty="0"/>
+              <a:t>V2.0</a:t>
+            </a:r>
+          </a:p>
+        </p:txBody>
+      </p:sp>
+      <p:sp>
+        <p:nvSpPr>
+          <p:cNvPr id="28" name="TextBox 27"/>
+          <p:cNvSpPr txBox="1"/>
+          <p:nvPr/>
+        </p:nvSpPr>
+        <p:spPr>
+          <a:xfrm>
+            <a:off x="5828176" y="4609855"/>
+            <a:ext cx="1118039" cy="369332"/>
+          </a:xfrm>
+          <a:prstGeom prst="rect">
+            <a:avLst/>
+          </a:prstGeom>
+          <a:noFill/>
+        </p:spPr>
+        <p:txBody>
+          <a:bodyPr wrap="square" rtlCol="0">
+            <a:spAutoFit/>
+          </a:bodyPr>
+          <a:lstStyle/>
+          <a:p>
+            <a:r>
+              <a:rPr lang="en-US" dirty="0"/>
+              <a:t>V3.0</a:t>
+            </a:r>
+          </a:p>
+        </p:txBody>
+      </p:sp>
+      <p:sp>
+        <p:nvSpPr>
+          <p:cNvPr id="29" name="Arrow: Right 28"/>
+          <p:cNvSpPr/>
+          <p:nvPr/>
+        </p:nvSpPr>
+        <p:spPr>
+          <a:xfrm>
+            <a:off x="5085975" y="3781447"/>
+            <a:ext cx="457200" cy="248478"/>
+          </a:xfrm>
+          <a:prstGeom prst="rightArrow">
+            <a:avLst/>
+          </a:prstGeom>
+        </p:spPr>
+        <p:style>
+          <a:lnRef idx="2">
+            <a:schemeClr val="accent1">
+              <a:shade val="50000"/>
+            </a:schemeClr>
+          </a:lnRef>
+          <a:fillRef idx="1">
+            <a:schemeClr val="accent1"/>
+          </a:fillRef>
+          <a:effectRef idx="0">
+            <a:schemeClr val="accent1"/>
+          </a:effectRef>
+          <a:fontRef idx="minor">
+            <a:schemeClr val="lt1"/>
+          </a:fontRef>
+        </p:style>
+        <p:txBody>
+          <a:bodyPr rtlCol="0" anchor="ctr"/>
+          <a:lstStyle/>
+          <a:p>
+            <a:pPr algn="ctr"/>
+            <a:endParaRPr lang="en-US"/>
+          </a:p>
+        </p:txBody>
+      </p:sp>
+      <p:sp>
+        <p:nvSpPr>
+          <p:cNvPr id="36" name="Content Placeholder 11"/>
+          <p:cNvSpPr txBox="1">
+            <a:spLocks/>
+          </p:cNvSpPr>
+          <p:nvPr/>
+        </p:nvSpPr>
+        <p:spPr>
+          <a:xfrm>
+            <a:off x="838200" y="5270779"/>
+            <a:ext cx="2292927" cy="594302"/>
+          </a:xfrm>
+          <a:prstGeom prst="rect">
+            <a:avLst/>
+          </a:prstGeom>
+        </p:spPr>
+        <p:txBody>
+          <a:bodyPr vert="horz" lIns="91440" tIns="45720" rIns="91440" bIns="45720" rtlCol="0">
+            <a:normAutofit/>
+          </a:bodyPr>
+          <a:lstStyle>
+            <a:lvl1pPr marL="228600" indent="-228600" algn="l" defTabSz="914400" rtl="0" eaLnBrk="1" latinLnBrk="0" hangingPunct="1">
+              <a:lnSpc>
+                <a:spcPct val="90000"/>
+              </a:lnSpc>
+              <a:spcBef>
+                <a:spcPts val="1000"/>
+              </a:spcBef>
+              <a:buFont typeface="Arial" panose="020B0604020202020204" pitchFamily="34" charset="0"/>
+              <a:buChar char="•"/>
+              <a:defRPr sz="2800" kern="1200">
+                <a:solidFill>
+                  <a:schemeClr val="tx1"/>
+                </a:solidFill>
+                <a:latin typeface="+mn-lt"/>
+                <a:ea typeface="+mn-ea"/>
+                <a:cs typeface="+mn-cs"/>
+              </a:defRPr>
+            </a:lvl1pPr>
+            <a:lvl2pPr marL="685800" indent="-228600" algn="l" defTabSz="914400" rtl="0" eaLnBrk="1" latinLnBrk="0" hangingPunct="1">
+              <a:lnSpc>
+                <a:spcPct val="90000"/>
+              </a:lnSpc>
+              <a:spcBef>
+                <a:spcPts val="500"/>
+              </a:spcBef>
+              <a:buFont typeface="Arial" panose="020B0604020202020204" pitchFamily="34" charset="0"/>
+              <a:buChar char="•"/>
+              <a:defRPr sz="2400" kern="1200">
+                <a:solidFill>
+                  <a:schemeClr val="tx1"/>
+                </a:solidFill>
+                <a:latin typeface="+mn-lt"/>
+                <a:ea typeface="+mn-ea"/>
+                <a:cs typeface="+mn-cs"/>
+              </a:defRPr>
+            </a:lvl2pPr>
+            <a:lvl3pPr marL="1143000" indent="-228600" algn="l" defTabSz="914400" rtl="0" eaLnBrk="1" latinLnBrk="0" hangingPunct="1">
+              <a:lnSpc>
+                <a:spcPct val="90000"/>
+              </a:lnSpc>
+              <a:spcBef>
+                <a:spcPts val="500"/>
+              </a:spcBef>
+              <a:buFont typeface="Arial" panose="020B0604020202020204" pitchFamily="34" charset="0"/>
+              <a:buChar char="•"/>
+              <a:defRPr sz="2000" kern="1200">
+                <a:solidFill>
+                  <a:schemeClr val="tx1"/>
+                </a:solidFill>
+                <a:latin typeface="+mn-lt"/>
+                <a:ea typeface="+mn-ea"/>
+                <a:cs typeface="+mn-cs"/>
+              </a:defRPr>
+            </a:lvl3pPr>
+            <a:lvl4pPr marL="1600200" indent="-228600" algn="l" defTabSz="914400" rtl="0" eaLnBrk="1" latinLnBrk="0" hangingPunct="1">
+              <a:lnSpc>
+                <a:spcPct val="90000"/>
+              </a:lnSpc>
+              <a:spcBef>
+                <a:spcPts val="500"/>
+              </a:spcBef>
+              <a:buFont typeface="Arial" panose="020B0604020202020204" pitchFamily="34" charset="0"/>
+              <a:buChar char="•"/>
+              <a:defRPr sz="1800" kern="1200">
+                <a:solidFill>
+                  <a:schemeClr val="tx1"/>
+                </a:solidFill>
+                <a:latin typeface="+mn-lt"/>
+                <a:ea typeface="+mn-ea"/>
+                <a:cs typeface="+mn-cs"/>
+              </a:defRPr>
+            </a:lvl4pPr>
+            <a:lvl5pPr marL="2057400" indent="-228600" algn="l" defTabSz="914400" rtl="0" eaLnBrk="1" latinLnBrk="0" hangingPunct="1">
+              <a:lnSpc>
+                <a:spcPct val="90000"/>
+              </a:lnSpc>
+              <a:spcBef>
+                <a:spcPts val="500"/>
+              </a:spcBef>
+              <a:buFont typeface="Arial" panose="020B0604020202020204" pitchFamily="34" charset="0"/>
+              <a:buChar char="•"/>
+              <a:defRPr sz="1800" kern="1200">
+                <a:solidFill>
+                  <a:schemeClr val="tx1"/>
+                </a:solidFill>
+                <a:latin typeface="+mn-lt"/>
+                <a:ea typeface="+mn-ea"/>
+                <a:cs typeface="+mn-cs"/>
+              </a:defRPr>
+            </a:lvl5pPr>
+            <a:lvl6pPr marL="2514600" indent="-228600" algn="l" defTabSz="914400" rtl="0" eaLnBrk="1" latinLnBrk="0" hangingPunct="1">
+              <a:lnSpc>
+                <a:spcPct val="90000"/>
+              </a:lnSpc>
+              <a:spcBef>
+                <a:spcPts val="500"/>
+              </a:spcBef>
+              <a:buFont typeface="Arial" panose="020B0604020202020204" pitchFamily="34" charset="0"/>
+              <a:buChar char="•"/>
+              <a:defRPr sz="1800" kern="1200">
+                <a:solidFill>
+                  <a:schemeClr val="tx1"/>
+                </a:solidFill>
+                <a:latin typeface="+mn-lt"/>
+                <a:ea typeface="+mn-ea"/>
+                <a:cs typeface="+mn-cs"/>
+              </a:defRPr>
+            </a:lvl6pPr>
+            <a:lvl7pPr marL="2971800" indent="-228600" algn="l" defTabSz="914400" rtl="0" eaLnBrk="1" latinLnBrk="0" hangingPunct="1">
+              <a:lnSpc>
+                <a:spcPct val="90000"/>
+              </a:lnSpc>
+              <a:spcBef>
+                <a:spcPts val="500"/>
+              </a:spcBef>
+              <a:buFont typeface="Arial" panose="020B0604020202020204" pitchFamily="34" charset="0"/>
+              <a:buChar char="•"/>
+              <a:defRPr sz="1800" kern="1200">
+                <a:solidFill>
+                  <a:schemeClr val="tx1"/>
+                </a:solidFill>
+                <a:latin typeface="+mn-lt"/>
+                <a:ea typeface="+mn-ea"/>
+                <a:cs typeface="+mn-cs"/>
+              </a:defRPr>
+            </a:lvl7pPr>
+            <a:lvl8pPr marL="3429000" indent="-228600" algn="l" defTabSz="914400" rtl="0" eaLnBrk="1" latinLnBrk="0" hangingPunct="1">
+              <a:lnSpc>
+                <a:spcPct val="90000"/>
+              </a:lnSpc>
+              <a:spcBef>
+                <a:spcPts val="500"/>
+              </a:spcBef>
+              <a:buFont typeface="Arial" panose="020B0604020202020204" pitchFamily="34" charset="0"/>
+              <a:buChar char="•"/>
+              <a:defRPr sz="1800" kern="1200">
+                <a:solidFill>
+                  <a:schemeClr val="tx1"/>
+                </a:solidFill>
+                <a:latin typeface="+mn-lt"/>
+                <a:ea typeface="+mn-ea"/>
+                <a:cs typeface="+mn-cs"/>
+              </a:defRPr>
+            </a:lvl8pPr>
+            <a:lvl9pPr marL="3886200" indent="-228600" algn="l" defTabSz="914400" rtl="0" eaLnBrk="1" latinLnBrk="0" hangingPunct="1">
+              <a:lnSpc>
+                <a:spcPct val="90000"/>
+              </a:lnSpc>
+              <a:spcBef>
+                <a:spcPts val="500"/>
+              </a:spcBef>
+              <a:buFont typeface="Arial" panose="020B0604020202020204" pitchFamily="34" charset="0"/>
+              <a:buChar char="•"/>
+              <a:defRPr sz="1800" kern="1200">
+                <a:solidFill>
+                  <a:schemeClr val="tx1"/>
+                </a:solidFill>
+                <a:latin typeface="+mn-lt"/>
+                <a:ea typeface="+mn-ea"/>
+                <a:cs typeface="+mn-cs"/>
+              </a:defRPr>
+            </a:lvl9pPr>
+          </a:lstStyle>
+          <a:p>
+            <a:pPr marL="0" indent="0">
+              <a:buFont typeface="Arial" panose="020B0604020202020204" pitchFamily="34" charset="0"/>
+              <a:buNone/>
+            </a:pPr>
+            <a:r>
+              <a:rPr lang="en-US" dirty="0"/>
+              <a:t>Customer C</a:t>
+            </a:r>
+          </a:p>
+        </p:txBody>
+      </p:sp>
+      <p:pic>
+        <p:nvPicPr>
+          <p:cNvPr id="37" name="Picture 36"/>
+          <p:cNvPicPr>
+            <a:picLocks noChangeAspect="1"/>
+          </p:cNvPicPr>
+          <p:nvPr/>
+        </p:nvPicPr>
+        <p:blipFill>
+          <a:blip r:embed="rId2"/>
+          <a:stretch>
+            <a:fillRect/>
+          </a:stretch>
+        </p:blipFill>
+        <p:spPr>
+          <a:xfrm>
+            <a:off x="4070146" y="5113359"/>
+            <a:ext cx="946169" cy="1271518"/>
+          </a:xfrm>
+          <a:prstGeom prst="rect">
+            <a:avLst/>
+          </a:prstGeom>
+        </p:spPr>
+      </p:pic>
+      <p:pic>
+        <p:nvPicPr>
+          <p:cNvPr id="38" name="Picture 37"/>
+          <p:cNvPicPr>
+            <a:picLocks noChangeAspect="1"/>
+          </p:cNvPicPr>
+          <p:nvPr/>
+        </p:nvPicPr>
+        <p:blipFill>
+          <a:blip r:embed="rId2"/>
+          <a:stretch>
+            <a:fillRect/>
+          </a:stretch>
+        </p:blipFill>
+        <p:spPr>
+          <a:xfrm>
+            <a:off x="5640548" y="5113359"/>
+            <a:ext cx="946169" cy="1271518"/>
+          </a:xfrm>
+          <a:prstGeom prst="rect">
+            <a:avLst/>
+          </a:prstGeom>
+        </p:spPr>
+      </p:pic>
+      <p:sp>
+        <p:nvSpPr>
+          <p:cNvPr id="39" name="TextBox 38"/>
+          <p:cNvSpPr txBox="1"/>
+          <p:nvPr/>
+        </p:nvSpPr>
+        <p:spPr>
+          <a:xfrm>
+            <a:off x="4177457" y="6415559"/>
+            <a:ext cx="1118039" cy="369332"/>
+          </a:xfrm>
+          <a:prstGeom prst="rect">
+            <a:avLst/>
+          </a:prstGeom>
+          <a:noFill/>
+        </p:spPr>
+        <p:txBody>
+          <a:bodyPr wrap="square" rtlCol="0">
+            <a:spAutoFit/>
+          </a:bodyPr>
+          <a:lstStyle/>
+          <a:p>
+            <a:r>
+              <a:rPr lang="en-US" dirty="0"/>
+              <a:t>V1.0</a:t>
+            </a:r>
+          </a:p>
+        </p:txBody>
+      </p:sp>
+      <p:sp>
+        <p:nvSpPr>
+          <p:cNvPr id="40" name="TextBox 39"/>
+          <p:cNvSpPr txBox="1"/>
+          <p:nvPr/>
+        </p:nvSpPr>
+        <p:spPr>
+          <a:xfrm>
+            <a:off x="5842032" y="6415559"/>
+            <a:ext cx="1118039" cy="369332"/>
+          </a:xfrm>
+          <a:prstGeom prst="rect">
+            <a:avLst/>
+          </a:prstGeom>
+          <a:noFill/>
+        </p:spPr>
+        <p:txBody>
+          <a:bodyPr wrap="square" rtlCol="0">
+            <a:spAutoFit/>
+          </a:bodyPr>
+          <a:lstStyle/>
+          <a:p>
+            <a:r>
+              <a:rPr lang="en-US" dirty="0"/>
+              <a:t>V3.0</a:t>
+            </a:r>
+          </a:p>
+        </p:txBody>
+      </p:sp>
+      <p:sp>
+        <p:nvSpPr>
+          <p:cNvPr id="41" name="Arrow: Right 40"/>
+          <p:cNvSpPr/>
+          <p:nvPr/>
+        </p:nvSpPr>
+        <p:spPr>
+          <a:xfrm>
+            <a:off x="5099831" y="5587151"/>
+            <a:ext cx="457200" cy="248478"/>
+          </a:xfrm>
+          <a:prstGeom prst="rightArrow">
+            <a:avLst/>
+          </a:prstGeom>
+        </p:spPr>
+        <p:style>
+          <a:lnRef idx="2">
+            <a:schemeClr val="accent1">
+              <a:shade val="50000"/>
+            </a:schemeClr>
+          </a:lnRef>
+          <a:fillRef idx="1">
+            <a:schemeClr val="accent1"/>
+          </a:fillRef>
+          <a:effectRef idx="0">
+            <a:schemeClr val="accent1"/>
+          </a:effectRef>
+          <a:fontRef idx="minor">
+            <a:schemeClr val="lt1"/>
+          </a:fontRef>
+        </p:style>
+        <p:txBody>
+          <a:bodyPr rtlCol="0" anchor="ctr"/>
+          <a:lstStyle/>
+          <a:p>
+            <a:pPr algn="ctr"/>
+            <a:endParaRPr lang="en-US"/>
+          </a:p>
+        </p:txBody>
+      </p:sp>
+    </p:spTree>
+    <p:extLst>
+      <p:ext uri="{BB962C8B-B14F-4D97-AF65-F5344CB8AC3E}">
+        <p14:creationId xmlns:p14="http://schemas.microsoft.com/office/powerpoint/2010/main" val="2965630298"/>
+      </p:ext>
+    </p:extLst>
+  </p:cSld>
+  <p:clrMapOvr>
+    <a:masterClrMapping/>
+  </p:clrMapOvr>
+</p:sld>
+</file>
+
+<file path=ppt/slides/slide21.xml><?xml version="1.0" encoding="utf-8"?>
 <p:sld xmlns:a="http://schemas.openxmlformats.org/drawingml/2006/main" xmlns:r="http://schemas.openxmlformats.org/officeDocument/2006/relationships" xmlns:p="http://schemas.openxmlformats.org/presentationml/2006/main">
   <p:cSld>
     <p:spTree>
@@ -5686,203 +6821,7 @@
 </p:sld>
 </file>
 
-<file path=ppt/slides/slide2.xml><?xml version="1.0" encoding="utf-8"?>
-<p:sld xmlns:a="http://schemas.openxmlformats.org/drawingml/2006/main" xmlns:r="http://schemas.openxmlformats.org/officeDocument/2006/relationships" xmlns:p="http://schemas.openxmlformats.org/presentationml/2006/main">
-  <p:cSld>
-    <p:spTree>
-      <p:nvGrpSpPr>
-        <p:cNvPr id="1" name=""/>
-        <p:cNvGrpSpPr/>
-        <p:nvPr/>
-      </p:nvGrpSpPr>
-      <p:grpSpPr>
-        <a:xfrm>
-          <a:off x="0" y="0"/>
-          <a:ext cx="0" cy="0"/>
-          <a:chOff x="0" y="0"/>
-          <a:chExt cx="0" cy="0"/>
-        </a:xfrm>
-      </p:grpSpPr>
-      <p:sp>
-        <p:nvSpPr>
-          <p:cNvPr id="4" name="Title 3"/>
-          <p:cNvSpPr>
-            <a:spLocks noGrp="1"/>
-          </p:cNvSpPr>
-          <p:nvPr>
-            <p:ph type="ctrTitle"/>
-          </p:nvPr>
-        </p:nvSpPr>
-        <p:spPr/>
-        <p:txBody>
-          <a:bodyPr/>
-          <a:lstStyle/>
-          <a:p>
-            <a:r>
-              <a:rPr lang="en-US" dirty="0"/>
-              <a:t>4.1 – Best Practices</a:t>
-            </a:r>
-          </a:p>
-        </p:txBody>
-      </p:sp>
-      <p:sp>
-        <p:nvSpPr>
-          <p:cNvPr id="5" name="Subtitle 4"/>
-          <p:cNvSpPr>
-            <a:spLocks noGrp="1"/>
-          </p:cNvSpPr>
-          <p:nvPr>
-            <p:ph type="subTitle" idx="1"/>
-          </p:nvPr>
-        </p:nvSpPr>
-        <p:spPr/>
-        <p:txBody>
-          <a:bodyPr/>
-          <a:lstStyle/>
-          <a:p>
-            <a:endParaRPr lang="en-US"/>
-          </a:p>
-        </p:txBody>
-      </p:sp>
-    </p:spTree>
-    <p:extLst>
-      <p:ext uri="{BB962C8B-B14F-4D97-AF65-F5344CB8AC3E}">
-        <p14:creationId xmlns:p14="http://schemas.microsoft.com/office/powerpoint/2010/main" val="4212081847"/>
-      </p:ext>
-    </p:extLst>
-  </p:cSld>
-  <p:clrMapOvr>
-    <a:masterClrMapping/>
-  </p:clrMapOvr>
-</p:sld>
-</file>
-
-<file path=ppt/slides/slide20.xml><?xml version="1.0" encoding="utf-8"?>
-<p:sld xmlns:a="http://schemas.openxmlformats.org/drawingml/2006/main" xmlns:r="http://schemas.openxmlformats.org/officeDocument/2006/relationships" xmlns:p="http://schemas.openxmlformats.org/presentationml/2006/main">
-  <p:cSld>
-    <p:spTree>
-      <p:nvGrpSpPr>
-        <p:cNvPr id="1" name=""/>
-        <p:cNvGrpSpPr/>
-        <p:nvPr/>
-      </p:nvGrpSpPr>
-      <p:grpSpPr>
-        <a:xfrm>
-          <a:off x="0" y="0"/>
-          <a:ext cx="0" cy="0"/>
-          <a:chOff x="0" y="0"/>
-          <a:chExt cx="0" cy="0"/>
-        </a:xfrm>
-      </p:grpSpPr>
-      <p:sp>
-        <p:nvSpPr>
-          <p:cNvPr id="2" name="Title 1"/>
-          <p:cNvSpPr>
-            <a:spLocks noGrp="1"/>
-          </p:cNvSpPr>
-          <p:nvPr>
-            <p:ph type="title"/>
-          </p:nvPr>
-        </p:nvSpPr>
-        <p:spPr/>
-        <p:txBody>
-          <a:bodyPr/>
-          <a:lstStyle/>
-          <a:p>
-            <a:r>
-              <a:rPr lang="en-US" dirty="0"/>
-              <a:t>Dealing with Disparate Environments</a:t>
-            </a:r>
-          </a:p>
-        </p:txBody>
-      </p:sp>
-      <p:sp>
-        <p:nvSpPr>
-          <p:cNvPr id="3" name="Content Placeholder 2"/>
-          <p:cNvSpPr>
-            <a:spLocks noGrp="1"/>
-          </p:cNvSpPr>
-          <p:nvPr>
-            <p:ph idx="1"/>
-          </p:nvPr>
-        </p:nvSpPr>
-        <p:spPr/>
-        <p:txBody>
-          <a:bodyPr/>
-          <a:lstStyle/>
-          <a:p>
-            <a:r>
-              <a:rPr lang="en-US" dirty="0"/>
-              <a:t>Alex Yates, DLM Consultants offers guidance</a:t>
-            </a:r>
-          </a:p>
-          <a:p>
-            <a:pPr lvl="1"/>
-            <a:r>
-              <a:rPr lang="en-US" dirty="0"/>
-              <a:t>Part 1 – Managing objects for different versions - </a:t>
-            </a:r>
-            <a:r>
-              <a:rPr lang="en-US" dirty="0">
-                <a:hlinkClick r:id="rId2"/>
-              </a:rPr>
-              <a:t>https://www.red-gate.com/blog/database-lifecycle-management/how-to-build-multiple-database-versions-from-the-same-source-using-sql-compare-filters</a:t>
-            </a:r>
-            <a:r>
-              <a:rPr lang="en-US" dirty="0"/>
-              <a:t> </a:t>
-            </a:r>
-          </a:p>
-          <a:p>
-            <a:pPr lvl="1"/>
-            <a:r>
-              <a:rPr lang="en-US" dirty="0"/>
-              <a:t>Part 2 – Post-deploy scripts - </a:t>
-            </a:r>
-            <a:r>
-              <a:rPr lang="en-US" dirty="0">
-                <a:hlinkClick r:id="rId3"/>
-              </a:rPr>
-              <a:t>http://www.red-gate.com/blog/database-lifecycle-management/post-deploy-scripts</a:t>
-            </a:r>
-            <a:r>
-              <a:rPr lang="en-US" dirty="0"/>
-              <a:t> </a:t>
-            </a:r>
-          </a:p>
-          <a:p>
-            <a:pPr lvl="1"/>
-            <a:r>
-              <a:rPr lang="en-US" dirty="0"/>
-              <a:t>Part 3 – Pre-deploy migration scripts - </a:t>
-            </a:r>
-            <a:r>
-              <a:rPr lang="en-US" dirty="0">
-                <a:hlinkClick r:id="rId4"/>
-              </a:rPr>
-              <a:t>http://www.red-gate.com/blog/database-lifecycle-management/pre-deploy-migration-scripts</a:t>
-            </a:r>
-            <a:r>
-              <a:rPr lang="en-US" dirty="0"/>
-              <a:t> </a:t>
-            </a:r>
-          </a:p>
-        </p:txBody>
-      </p:sp>
-    </p:spTree>
-    <p:extLst>
-      <p:ext uri="{BB962C8B-B14F-4D97-AF65-F5344CB8AC3E}">
-        <p14:creationId xmlns:p14="http://schemas.microsoft.com/office/powerpoint/2010/main" val="765715962"/>
-      </p:ext>
-    </p:extLst>
-  </p:cSld>
-  <p:clrMapOvr>
-    <a:masterClrMapping/>
-  </p:clrMapOvr>
-</p:sld>
-</file>
-
-<file path=ppt/slides/slide21.xml><?xml version="1.0" encoding="utf-8"?>
+<file path=ppt/slides/slide22.xml><?xml version="1.0" encoding="utf-8"?>
 <p:sld xmlns:a="http://schemas.openxmlformats.org/drawingml/2006/main" xmlns:r="http://schemas.openxmlformats.org/officeDocument/2006/relationships" xmlns:p="http://schemas.openxmlformats.org/presentationml/2006/main">
   <p:cSld>
     <p:spTree>
@@ -6856,6 +7795,131 @@
 </p:sld>
 </file>
 
+<file path=ppt/slides/slide23.xml><?xml version="1.0" encoding="utf-8"?>
+<p:sld xmlns:a="http://schemas.openxmlformats.org/drawingml/2006/main" xmlns:r="http://schemas.openxmlformats.org/officeDocument/2006/relationships" xmlns:p="http://schemas.openxmlformats.org/presentationml/2006/main">
+  <p:cSld>
+    <p:spTree>
+      <p:nvGrpSpPr>
+        <p:cNvPr id="1" name=""/>
+        <p:cNvGrpSpPr/>
+        <p:nvPr/>
+      </p:nvGrpSpPr>
+      <p:grpSpPr>
+        <a:xfrm>
+          <a:off x="0" y="0"/>
+          <a:ext cx="0" cy="0"/>
+          <a:chOff x="0" y="0"/>
+          <a:chExt cx="0" cy="0"/>
+        </a:xfrm>
+      </p:grpSpPr>
+      <p:sp>
+        <p:nvSpPr>
+          <p:cNvPr id="2" name="Title 1"/>
+          <p:cNvSpPr>
+            <a:spLocks noGrp="1"/>
+          </p:cNvSpPr>
+          <p:nvPr>
+            <p:ph type="title"/>
+          </p:nvPr>
+        </p:nvSpPr>
+        <p:spPr/>
+        <p:txBody>
+          <a:bodyPr/>
+          <a:lstStyle/>
+          <a:p>
+            <a:r>
+              <a:rPr lang="en-US" dirty="0"/>
+              <a:t>Dealing with Disparate Environments</a:t>
+            </a:r>
+          </a:p>
+        </p:txBody>
+      </p:sp>
+      <p:sp>
+        <p:nvSpPr>
+          <p:cNvPr id="3" name="Content Placeholder 2"/>
+          <p:cNvSpPr>
+            <a:spLocks noGrp="1"/>
+          </p:cNvSpPr>
+          <p:nvPr>
+            <p:ph idx="1"/>
+          </p:nvPr>
+        </p:nvSpPr>
+        <p:spPr/>
+        <p:txBody>
+          <a:bodyPr/>
+          <a:lstStyle/>
+          <a:p>
+            <a:r>
+              <a:rPr lang="en-US" dirty="0"/>
+              <a:t>Alex Yates, DLM Consultants offers guidance</a:t>
+            </a:r>
+          </a:p>
+          <a:p>
+            <a:pPr lvl="1"/>
+            <a:r>
+              <a:rPr lang="en-US" dirty="0"/>
+              <a:t>Part 1 – Managing objects for different versions - </a:t>
+            </a:r>
+            <a:r>
+              <a:rPr lang="en-US" dirty="0">
+                <a:hlinkClick r:id="rId2"/>
+              </a:rPr>
+              <a:t>https://www.red-gate.com/blog/database-lifecycle-management/how-to-build-multiple-database-versions-from-the-same-source-using-sql-compare-filters</a:t>
+            </a:r>
+            <a:r>
+              <a:rPr lang="en-US" dirty="0"/>
+              <a:t> </a:t>
+            </a:r>
+          </a:p>
+          <a:p>
+            <a:pPr lvl="1"/>
+            <a:r>
+              <a:rPr lang="en-US" dirty="0"/>
+              <a:t>Part 2 – Post-deploy scripts - </a:t>
+            </a:r>
+            <a:r>
+              <a:rPr lang="en-US" dirty="0">
+                <a:hlinkClick r:id="rId3"/>
+              </a:rPr>
+              <a:t>http://www.red-gate.com/blog/database-lifecycle-management/post-deploy-scripts</a:t>
+            </a:r>
+            <a:r>
+              <a:rPr lang="en-US" dirty="0"/>
+              <a:t> </a:t>
+            </a:r>
+          </a:p>
+          <a:p>
+            <a:pPr lvl="1"/>
+            <a:r>
+              <a:rPr lang="en-US" dirty="0"/>
+              <a:t>Part 3 – Pre-deploy migration scripts - </a:t>
+            </a:r>
+            <a:r>
+              <a:rPr lang="en-US" dirty="0">
+                <a:hlinkClick r:id="rId4"/>
+              </a:rPr>
+              <a:t>http://www.red-gate.com/blog/database-lifecycle-management/pre-deploy-migration-scripts</a:t>
+            </a:r>
+            <a:r>
+              <a:rPr lang="en-US" dirty="0"/>
+              <a:t> </a:t>
+            </a:r>
+          </a:p>
+        </p:txBody>
+      </p:sp>
+    </p:spTree>
+    <p:extLst>
+      <p:ext uri="{BB962C8B-B14F-4D97-AF65-F5344CB8AC3E}">
+        <p14:creationId xmlns:p14="http://schemas.microsoft.com/office/powerpoint/2010/main" val="765715962"/>
+      </p:ext>
+    </p:extLst>
+  </p:cSld>
+  <p:clrMapOvr>
+    <a:masterClrMapping/>
+  </p:clrMapOvr>
+</p:sld>
+</file>
+
 <file path=ppt/slides/slide3.xml><?xml version="1.0" encoding="utf-8"?>
 <p:sld xmlns:a="http://schemas.openxmlformats.org/drawingml/2006/main" xmlns:r="http://schemas.openxmlformats.org/officeDocument/2006/relationships" xmlns:p="http://schemas.openxmlformats.org/presentationml/2006/main">
   <p:cSld>
@@ -6927,6 +7991,33 @@
             <a:r>
               <a:rPr lang="en-US" dirty="0"/>
               <a:t>These changes don’t disturb the application</a:t>
+            </a:r>
+          </a:p>
+          <a:p>
+            <a:pPr lvl="1"/>
+            <a:r>
+              <a:rPr lang="en-US" dirty="0"/>
+              <a:t>Users are unaware until we enable the feature</a:t>
+            </a:r>
+          </a:p>
+          <a:p>
+            <a:r>
+              <a:rPr lang="en-US" dirty="0"/>
+              <a:t>Database dark launching</a:t>
+            </a:r>
+          </a:p>
+          <a:p>
+            <a:pPr lvl="1"/>
+            <a:r>
+              <a:rPr lang="en-US" dirty="0"/>
+              <a:t>New columns for tables/views</a:t>
+            </a:r>
+          </a:p>
+          <a:p>
+            <a:pPr lvl="1"/>
+            <a:r>
+              <a:rPr lang="en-US" dirty="0"/>
+              <a:t>New parameters for stored procedures to change behavior</a:t>
             </a:r>
           </a:p>
           <a:p>
@@ -7071,6 +8162,92 @@
           <a:p>
             <a:r>
               <a:rPr lang="en-US" dirty="0"/>
+              <a:t>Use Views Carefully</a:t>
+            </a:r>
+          </a:p>
+        </p:txBody>
+      </p:sp>
+      <p:sp>
+        <p:nvSpPr>
+          <p:cNvPr id="3" name="Content Placeholder 2"/>
+          <p:cNvSpPr>
+            <a:spLocks noGrp="1"/>
+          </p:cNvSpPr>
+          <p:nvPr>
+            <p:ph idx="1"/>
+          </p:nvPr>
+        </p:nvSpPr>
+        <p:spPr/>
+        <p:txBody>
+          <a:bodyPr/>
+          <a:lstStyle/>
+          <a:p>
+            <a:r>
+              <a:rPr lang="en-US" dirty="0"/>
+              <a:t>Views can ease table schema changes</a:t>
+            </a:r>
+          </a:p>
+          <a:p>
+            <a:r>
+              <a:rPr lang="en-US" dirty="0"/>
+              <a:t>Be aware of insert/update/delete limitations</a:t>
+            </a:r>
+          </a:p>
+          <a:p>
+            <a:r>
+              <a:rPr lang="en-US" dirty="0"/>
+              <a:t>Avoid nesting views</a:t>
+            </a:r>
+          </a:p>
+        </p:txBody>
+      </p:sp>
+    </p:spTree>
+    <p:extLst>
+      <p:ext uri="{BB962C8B-B14F-4D97-AF65-F5344CB8AC3E}">
+        <p14:creationId xmlns:p14="http://schemas.microsoft.com/office/powerpoint/2010/main" val="346354708"/>
+      </p:ext>
+    </p:extLst>
+  </p:cSld>
+  <p:clrMapOvr>
+    <a:masterClrMapping/>
+  </p:clrMapOvr>
+</p:sld>
+</file>
+
+<file path=ppt/slides/slide6.xml><?xml version="1.0" encoding="utf-8"?>
+<p:sld xmlns:a="http://schemas.openxmlformats.org/drawingml/2006/main" xmlns:r="http://schemas.openxmlformats.org/officeDocument/2006/relationships" xmlns:p="http://schemas.openxmlformats.org/presentationml/2006/main">
+  <p:cSld>
+    <p:spTree>
+      <p:nvGrpSpPr>
+        <p:cNvPr id="1" name=""/>
+        <p:cNvGrpSpPr/>
+        <p:nvPr/>
+      </p:nvGrpSpPr>
+      <p:grpSpPr>
+        <a:xfrm>
+          <a:off x="0" y="0"/>
+          <a:ext cx="0" cy="0"/>
+          <a:chOff x="0" y="0"/>
+          <a:chExt cx="0" cy="0"/>
+        </a:xfrm>
+      </p:grpSpPr>
+      <p:sp>
+        <p:nvSpPr>
+          <p:cNvPr id="2" name="Title 1"/>
+          <p:cNvSpPr>
+            <a:spLocks noGrp="1"/>
+          </p:cNvSpPr>
+          <p:nvPr>
+            <p:ph type="title"/>
+          </p:nvPr>
+        </p:nvSpPr>
+        <p:spPr/>
+        <p:txBody>
+          <a:bodyPr/>
+          <a:lstStyle/>
+          <a:p>
+            <a:r>
+              <a:rPr lang="en-US" dirty="0"/>
               <a:t>Best Practices for Development</a:t>
             </a:r>
           </a:p>
@@ -7141,86 +8318,6 @@
 </p:sld>
 </file>
 
-<file path=ppt/slides/slide6.xml><?xml version="1.0" encoding="utf-8"?>
-<p:sld xmlns:a="http://schemas.openxmlformats.org/drawingml/2006/main" xmlns:r="http://schemas.openxmlformats.org/officeDocument/2006/relationships" xmlns:p="http://schemas.openxmlformats.org/presentationml/2006/main">
-  <p:cSld>
-    <p:spTree>
-      <p:nvGrpSpPr>
-        <p:cNvPr id="1" name=""/>
-        <p:cNvGrpSpPr/>
-        <p:nvPr/>
-      </p:nvGrpSpPr>
-      <p:grpSpPr>
-        <a:xfrm>
-          <a:off x="0" y="0"/>
-          <a:ext cx="0" cy="0"/>
-          <a:chOff x="0" y="0"/>
-          <a:chExt cx="0" cy="0"/>
-        </a:xfrm>
-      </p:grpSpPr>
-      <p:sp>
-        <p:nvSpPr>
-          <p:cNvPr id="2" name="Title 1"/>
-          <p:cNvSpPr>
-            <a:spLocks noGrp="1"/>
-          </p:cNvSpPr>
-          <p:nvPr>
-            <p:ph type="title"/>
-          </p:nvPr>
-        </p:nvSpPr>
-        <p:spPr/>
-        <p:txBody>
-          <a:bodyPr/>
-          <a:lstStyle/>
-          <a:p>
-            <a:r>
-              <a:rPr lang="en-US" dirty="0"/>
-              <a:t>Use Views Carefully</a:t>
-            </a:r>
-          </a:p>
-        </p:txBody>
-      </p:sp>
-      <p:sp>
-        <p:nvSpPr>
-          <p:cNvPr id="3" name="Content Placeholder 2"/>
-          <p:cNvSpPr>
-            <a:spLocks noGrp="1"/>
-          </p:cNvSpPr>
-          <p:nvPr>
-            <p:ph idx="1"/>
-          </p:nvPr>
-        </p:nvSpPr>
-        <p:spPr/>
-        <p:txBody>
-          <a:bodyPr/>
-          <a:lstStyle/>
-          <a:p>
-            <a:r>
-              <a:rPr lang="en-US" dirty="0"/>
-              <a:t>Views can ease table schema changes</a:t>
-            </a:r>
-          </a:p>
-          <a:p>
-            <a:r>
-              <a:rPr lang="en-US" dirty="0"/>
-              <a:t>Avoid nesting views</a:t>
-            </a:r>
-          </a:p>
-        </p:txBody>
-      </p:sp>
-    </p:spTree>
-    <p:extLst>
-      <p:ext uri="{BB962C8B-B14F-4D97-AF65-F5344CB8AC3E}">
-        <p14:creationId xmlns:p14="http://schemas.microsoft.com/office/powerpoint/2010/main" val="346354708"/>
-      </p:ext>
-    </p:extLst>
-  </p:cSld>
-  <p:clrMapOvr>
-    <a:masterClrMapping/>
-  </p:clrMapOvr>
-</p:sld>
-</file>
-
 <file path=ppt/slides/slide7.xml><?xml version="1.0" encoding="utf-8"?>
 <p:sld xmlns:a="http://schemas.openxmlformats.org/drawingml/2006/main" xmlns:r="http://schemas.openxmlformats.org/officeDocument/2006/relationships" xmlns:p="http://schemas.openxmlformats.org/presentationml/2006/main">
   <p:cSld>
@@ -7363,6 +8460,26 @@
           <a:p>
             <a:r>
               <a:rPr lang="en-US" dirty="0"/>
+              <a:t>Two types</a:t>
+            </a:r>
+          </a:p>
+          <a:p>
+            <a:pPr lvl="1"/>
+            <a:r>
+              <a:rPr lang="en-US" dirty="0"/>
+              <a:t>Old objects</a:t>
+            </a:r>
+          </a:p>
+          <a:p>
+            <a:pPr lvl="1"/>
+            <a:r>
+              <a:rPr lang="en-US" dirty="0"/>
+              <a:t>Old data</a:t>
+            </a:r>
+          </a:p>
+          <a:p>
+            <a:r>
+              <a:rPr lang="en-US" dirty="0"/>
               <a:t>Limit technical debt</a:t>
             </a:r>
           </a:p>
@@ -7370,6 +8487,12 @@
             <a:r>
               <a:rPr lang="en-US" dirty="0"/>
               <a:t>Use shared calendar reminders to schedule DROPs</a:t>
+            </a:r>
+          </a:p>
+          <a:p>
+            <a:r>
+              <a:rPr lang="en-US" dirty="0"/>
+              <a:t>Management support is helpful</a:t>
             </a:r>
           </a:p>
         </p:txBody>

</xml_diff>